<commit_message>
Updated for Edmonton Microsoft Data Professionals UG
</commit_message>
<xml_diff>
--- a/Microsoft Fabric/Data - The Fabric Of Our Lives/20250121 - Edmonton Microsoft Data Professionals - Data - The Fabric Of Our Lives.pptx
+++ b/Microsoft Fabric/Data - The Fabric Of Our Lives/20250121 - Edmonton Microsoft Data Professionals - Data - The Fabric Of Our Lives.pptx
@@ -9138,12 +9138,8 @@
             <a:pPr algn="l"/>
             <a:r>
               <a:rPr lang="en-US" sz="2400" dirty="0"/>
-              <a:t>Limitations detailed at: https://learn.microsoft.com/en-us/power-bi/enterprise/directlake-overview#known-issues-and-limitations</a:t>
-            </a:r>
-          </a:p>
-          <a:p>
-            <a:pPr algn="l"/>
-            <a:endParaRPr lang="en-US" sz="2400" dirty="0"/>
+              <a:t>Limitations detailed at: https://learn.microsoft.com/en-us/fabric/get-started/direct-lake-overview#considerations-and-limitations</a:t>
+            </a:r>
           </a:p>
         </p:txBody>
       </p:sp>
@@ -9625,7 +9621,7 @@
         </p:spPr>
         <p:txBody>
           <a:bodyPr>
-            <a:normAutofit lnSpcReduction="10000"/>
+            <a:normAutofit/>
           </a:bodyPr>
           <a:lstStyle/>
           <a:p>
@@ -9654,19 +9650,12 @@
             <a:pPr algn="l"/>
             <a:r>
               <a:rPr lang="en-US" sz="2400" dirty="0"/>
-              <a:t>learn.microsoft.com/en-us/fabric/get-started/microsoft-fabric-overview</a:t>
+              <a:t>https://learn.microsoft.com/en-us/training/fabric/</a:t>
             </a:r>
           </a:p>
           <a:p>
             <a:pPr algn="l"/>
             <a:endParaRPr lang="en-US" sz="2400" dirty="0"/>
-          </a:p>
-          <a:p>
-            <a:pPr algn="l"/>
-            <a:r>
-              <a:rPr lang="en-US" sz="2400" dirty="0"/>
-              <a:t>aka.ms/fabric-learn</a:t>
-            </a:r>
           </a:p>
           <a:p>
             <a:pPr algn="l"/>

</xml_diff>